<commit_message>
Updated presentation, added some docs in script
</commit_message>
<xml_diff>
--- a/downtimeless_pg_upgrading.pptx
+++ b/downtimeless_pg_upgrading.pptx
@@ -5,7 +5,7 @@
     <p:sldMasterId id="2147483648" r:id="rId1"/>
   </p:sldMasterIdLst>
   <p:notesMasterIdLst>
-    <p:notesMasterId r:id="rId14"/>
+    <p:notesMasterId r:id="rId15"/>
   </p:notesMasterIdLst>
   <p:sldIdLst>
     <p:sldId id="256" r:id="rId2"/>
@@ -14,12 +14,13 @@
     <p:sldId id="262" r:id="rId5"/>
     <p:sldId id="259" r:id="rId6"/>
     <p:sldId id="260" r:id="rId7"/>
-    <p:sldId id="263" r:id="rId8"/>
-    <p:sldId id="264" r:id="rId9"/>
-    <p:sldId id="265" r:id="rId10"/>
-    <p:sldId id="266" r:id="rId11"/>
-    <p:sldId id="267" r:id="rId12"/>
-    <p:sldId id="268" r:id="rId13"/>
+    <p:sldId id="269" r:id="rId8"/>
+    <p:sldId id="263" r:id="rId9"/>
+    <p:sldId id="264" r:id="rId10"/>
+    <p:sldId id="265" r:id="rId11"/>
+    <p:sldId id="266" r:id="rId12"/>
+    <p:sldId id="267" r:id="rId13"/>
+    <p:sldId id="268" r:id="rId14"/>
   </p:sldIdLst>
   <p:sldSz cx="12192000" cy="6858000"/>
   <p:notesSz cx="6858000" cy="9144000"/>
@@ -212,7 +213,7 @@
           <a:p>
             <a:fld id="{60D458B8-91BB-4BF7-87CF-CDB41C6C9A23}" type="datetimeFigureOut">
               <a:rPr lang="en-GB" smtClean="0"/>
-              <a:t>16/05/2019</a:t>
+              <a:t>17/05/2019</a:t>
             </a:fld>
             <a:endParaRPr lang="en-GB"/>
           </a:p>
@@ -693,7 +694,7 @@
           <a:p>
             <a:fld id="{B8D81AD5-43CA-494F-B19A-8B3AD3387031}" type="datetimeFigureOut">
               <a:rPr lang="nl-BE" smtClean="0"/>
-              <a:t>16/05/2019</a:t>
+              <a:t>17/05/2019</a:t>
             </a:fld>
             <a:endParaRPr lang="nl-BE"/>
           </a:p>
@@ -911,7 +912,7 @@
           <a:p>
             <a:fld id="{B8D81AD5-43CA-494F-B19A-8B3AD3387031}" type="datetimeFigureOut">
               <a:rPr lang="nl-BE" smtClean="0"/>
-              <a:t>16/05/2019</a:t>
+              <a:t>17/05/2019</a:t>
             </a:fld>
             <a:endParaRPr lang="nl-BE"/>
           </a:p>
@@ -1091,7 +1092,7 @@
           <a:p>
             <a:fld id="{B8D81AD5-43CA-494F-B19A-8B3AD3387031}" type="datetimeFigureOut">
               <a:rPr lang="nl-BE" smtClean="0"/>
-              <a:t>16/05/2019</a:t>
+              <a:t>17/05/2019</a:t>
             </a:fld>
             <a:endParaRPr lang="nl-BE"/>
           </a:p>
@@ -1285,7 +1286,7 @@
           <a:p>
             <a:fld id="{B8D81AD5-43CA-494F-B19A-8B3AD3387031}" type="datetimeFigureOut">
               <a:rPr lang="nl-BE" smtClean="0"/>
-              <a:t>16/05/2019</a:t>
+              <a:t>17/05/2019</a:t>
             </a:fld>
             <a:endParaRPr lang="nl-BE"/>
           </a:p>
@@ -1557,7 +1558,7 @@
           <a:p>
             <a:fld id="{B8D81AD5-43CA-494F-B19A-8B3AD3387031}" type="datetimeFigureOut">
               <a:rPr lang="nl-BE" smtClean="0"/>
-              <a:t>16/05/2019</a:t>
+              <a:t>17/05/2019</a:t>
             </a:fld>
             <a:endParaRPr lang="nl-BE"/>
           </a:p>
@@ -1610,7 +1611,7 @@
           <p:cNvPr id="8" name="Rectangle 7">
             <a:extLst>
               <a:ext uri="{FF2B5EF4-FFF2-40B4-BE49-F238E27FC236}">
-                <a16:creationId xmlns:a16="http://schemas.microsoft.com/office/drawing/2014/main" xmlns="" id="{B8462C32-ABD0-47FE-A702-6E5A3CCE299A}"/>
+                <a16:creationId xmlns="" xmlns:a16="http://schemas.microsoft.com/office/drawing/2014/main" id="{B8462C32-ABD0-47FE-A702-6E5A3CCE299A}"/>
               </a:ext>
             </a:extLst>
           </p:cNvPr>
@@ -1867,7 +1868,7 @@
           <a:p>
             <a:fld id="{B8D81AD5-43CA-494F-B19A-8B3AD3387031}" type="datetimeFigureOut">
               <a:rPr lang="nl-BE" smtClean="0"/>
-              <a:t>16/05/2019</a:t>
+              <a:t>17/05/2019</a:t>
             </a:fld>
             <a:endParaRPr lang="nl-BE"/>
           </a:p>
@@ -2258,7 +2259,7 @@
           <a:p>
             <a:fld id="{B8D81AD5-43CA-494F-B19A-8B3AD3387031}" type="datetimeFigureOut">
               <a:rPr lang="nl-BE" smtClean="0"/>
-              <a:t>16/05/2019</a:t>
+              <a:t>17/05/2019</a:t>
             </a:fld>
             <a:endParaRPr lang="nl-BE"/>
           </a:p>
@@ -2400,7 +2401,7 @@
           <a:p>
             <a:fld id="{B8D81AD5-43CA-494F-B19A-8B3AD3387031}" type="datetimeFigureOut">
               <a:rPr lang="nl-BE" smtClean="0"/>
-              <a:t>16/05/2019</a:t>
+              <a:t>17/05/2019</a:t>
             </a:fld>
             <a:endParaRPr lang="nl-BE"/>
           </a:p>
@@ -2495,7 +2496,7 @@
           <a:p>
             <a:fld id="{B8D81AD5-43CA-494F-B19A-8B3AD3387031}" type="datetimeFigureOut">
               <a:rPr lang="nl-BE" smtClean="0"/>
-              <a:t>16/05/2019</a:t>
+              <a:t>17/05/2019</a:t>
             </a:fld>
             <a:endParaRPr lang="nl-BE"/>
           </a:p>
@@ -2772,7 +2773,7 @@
           <a:p>
             <a:fld id="{B8D81AD5-43CA-494F-B19A-8B3AD3387031}" type="datetimeFigureOut">
               <a:rPr lang="nl-BE" smtClean="0"/>
-              <a:t>16/05/2019</a:t>
+              <a:t>17/05/2019</a:t>
             </a:fld>
             <a:endParaRPr lang="nl-BE"/>
           </a:p>
@@ -3025,7 +3026,7 @@
           <a:p>
             <a:fld id="{B8D81AD5-43CA-494F-B19A-8B3AD3387031}" type="datetimeFigureOut">
               <a:rPr lang="nl-BE" smtClean="0"/>
-              <a:t>16/05/2019</a:t>
+              <a:t>17/05/2019</a:t>
             </a:fld>
             <a:endParaRPr lang="nl-BE"/>
           </a:p>
@@ -3242,7 +3243,7 @@
           <a:p>
             <a:fld id="{B8D81AD5-43CA-494F-B19A-8B3AD3387031}" type="datetimeFigureOut">
               <a:rPr lang="nl-BE" smtClean="0"/>
-              <a:t>16/05/2019</a:t>
+              <a:t>17/05/2019</a:t>
             </a:fld>
             <a:endParaRPr lang="nl-BE"/>
           </a:p>
@@ -3697,7 +3698,7 @@
           <p:cNvPr id="2" name="Subtitle 1">
             <a:extLst>
               <a:ext uri="{FF2B5EF4-FFF2-40B4-BE49-F238E27FC236}">
-                <a16:creationId xmlns:a16="http://schemas.microsoft.com/office/drawing/2014/main" xmlns="" id="{AF2DF1DB-93CC-4445-AB27-62F95B0BC383}"/>
+                <a16:creationId xmlns="" xmlns:a16="http://schemas.microsoft.com/office/drawing/2014/main" id="{AF2DF1DB-93CC-4445-AB27-62F95B0BC383}"/>
               </a:ext>
             </a:extLst>
           </p:cNvPr>
@@ -3726,7 +3727,7 @@
           <p:cNvPr id="3" name="Title 2">
             <a:extLst>
               <a:ext uri="{FF2B5EF4-FFF2-40B4-BE49-F238E27FC236}">
-                <a16:creationId xmlns:a16="http://schemas.microsoft.com/office/drawing/2014/main" xmlns="" id="{DA150F5F-3913-42D2-8F7F-5CAE479C03A6}"/>
+                <a16:creationId xmlns="" xmlns:a16="http://schemas.microsoft.com/office/drawing/2014/main" id="{DA150F5F-3913-42D2-8F7F-5CAE479C03A6}"/>
               </a:ext>
             </a:extLst>
           </p:cNvPr>
@@ -4124,191 +4125,10 @@
           </a:p>
         </p:txBody>
       </p:sp>
-      <p:sp>
-        <p:nvSpPr>
-          <p:cNvPr id="12" name="Right Arrow 11"/>
-          <p:cNvSpPr/>
-          <p:nvPr/>
-        </p:nvSpPr>
-        <p:spPr>
-          <a:xfrm rot="2291273">
-            <a:off x="6693030" y="3397152"/>
-            <a:ext cx="1066800" cy="226243"/>
-          </a:xfrm>
-          <a:prstGeom prst="rightArrow">
-            <a:avLst/>
-          </a:prstGeom>
-        </p:spPr>
-        <p:style>
-          <a:lnRef idx="2">
-            <a:schemeClr val="accent1">
-              <a:shade val="50000"/>
-            </a:schemeClr>
-          </a:lnRef>
-          <a:fillRef idx="1">
-            <a:schemeClr val="accent1"/>
-          </a:fillRef>
-          <a:effectRef idx="0">
-            <a:schemeClr val="accent1"/>
-          </a:effectRef>
-          <a:fontRef idx="minor">
-            <a:schemeClr val="lt1"/>
-          </a:fontRef>
-        </p:style>
-        <p:txBody>
-          <a:bodyPr rtlCol="0" anchor="ctr"/>
-          <a:lstStyle/>
-          <a:p>
-            <a:pPr algn="ctr"/>
-            <a:endParaRPr lang="en-US"/>
-          </a:p>
-        </p:txBody>
-      </p:sp>
-      <p:sp>
-        <p:nvSpPr>
-          <p:cNvPr id="9" name="&quot;No&quot; Symbol 8"/>
-          <p:cNvSpPr/>
-          <p:nvPr/>
-        </p:nvSpPr>
-        <p:spPr>
-          <a:xfrm>
-            <a:off x="2191732" y="3902470"/>
-            <a:ext cx="1857080" cy="1785259"/>
-          </a:xfrm>
-          <a:prstGeom prst="noSmoking">
-            <a:avLst/>
-          </a:prstGeom>
-          <a:solidFill>
-            <a:schemeClr val="accent2"/>
-          </a:solidFill>
-        </p:spPr>
-        <p:style>
-          <a:lnRef idx="2">
-            <a:schemeClr val="accent1">
-              <a:shade val="50000"/>
-            </a:schemeClr>
-          </a:lnRef>
-          <a:fillRef idx="1">
-            <a:schemeClr val="accent1"/>
-          </a:fillRef>
-          <a:effectRef idx="0">
-            <a:schemeClr val="accent1"/>
-          </a:effectRef>
-          <a:fontRef idx="minor">
-            <a:schemeClr val="lt1"/>
-          </a:fontRef>
-        </p:style>
-        <p:txBody>
-          <a:bodyPr rtlCol="0" anchor="ctr"/>
-          <a:lstStyle/>
-          <a:p>
-            <a:pPr algn="ctr"/>
-            <a:endParaRPr lang="en-US">
-              <a:solidFill>
-                <a:schemeClr val="tx1"/>
-              </a:solidFill>
-            </a:endParaRPr>
-          </a:p>
-        </p:txBody>
-      </p:sp>
-      <p:sp>
-        <p:nvSpPr>
-          <p:cNvPr id="13" name="&quot;No&quot; Symbol 12"/>
-          <p:cNvSpPr/>
-          <p:nvPr/>
-        </p:nvSpPr>
-        <p:spPr>
-          <a:xfrm>
-            <a:off x="3690991" y="3225799"/>
-            <a:ext cx="411476" cy="431612"/>
-          </a:xfrm>
-          <a:prstGeom prst="noSmoking">
-            <a:avLst/>
-          </a:prstGeom>
-          <a:solidFill>
-            <a:schemeClr val="accent2"/>
-          </a:solidFill>
-        </p:spPr>
-        <p:style>
-          <a:lnRef idx="2">
-            <a:schemeClr val="accent1">
-              <a:shade val="50000"/>
-            </a:schemeClr>
-          </a:lnRef>
-          <a:fillRef idx="1">
-            <a:schemeClr val="accent1"/>
-          </a:fillRef>
-          <a:effectRef idx="0">
-            <a:schemeClr val="accent1"/>
-          </a:effectRef>
-          <a:fontRef idx="minor">
-            <a:schemeClr val="lt1"/>
-          </a:fontRef>
-        </p:style>
-        <p:txBody>
-          <a:bodyPr rtlCol="0" anchor="ctr"/>
-          <a:lstStyle/>
-          <a:p>
-            <a:pPr algn="ctr"/>
-            <a:endParaRPr lang="en-US">
-              <a:solidFill>
-                <a:schemeClr val="tx1"/>
-              </a:solidFill>
-            </a:endParaRPr>
-          </a:p>
-        </p:txBody>
-      </p:sp>
-      <p:sp>
-        <p:nvSpPr>
-          <p:cNvPr id="14" name="&quot;No&quot; Symbol 13"/>
-          <p:cNvSpPr/>
-          <p:nvPr/>
-        </p:nvSpPr>
-        <p:spPr>
-          <a:xfrm>
-            <a:off x="5090667" y="4363542"/>
-            <a:ext cx="845107" cy="863113"/>
-          </a:xfrm>
-          <a:prstGeom prst="noSmoking">
-            <a:avLst/>
-          </a:prstGeom>
-          <a:solidFill>
-            <a:schemeClr val="accent2"/>
-          </a:solidFill>
-        </p:spPr>
-        <p:style>
-          <a:lnRef idx="2">
-            <a:schemeClr val="accent1">
-              <a:shade val="50000"/>
-            </a:schemeClr>
-          </a:lnRef>
-          <a:fillRef idx="1">
-            <a:schemeClr val="accent1"/>
-          </a:fillRef>
-          <a:effectRef idx="0">
-            <a:schemeClr val="accent1"/>
-          </a:effectRef>
-          <a:fontRef idx="minor">
-            <a:schemeClr val="lt1"/>
-          </a:fontRef>
-        </p:style>
-        <p:txBody>
-          <a:bodyPr rtlCol="0" anchor="ctr"/>
-          <a:lstStyle/>
-          <a:p>
-            <a:pPr algn="ctr"/>
-            <a:endParaRPr lang="en-US">
-              <a:solidFill>
-                <a:schemeClr val="tx1"/>
-              </a:solidFill>
-            </a:endParaRPr>
-          </a:p>
-        </p:txBody>
-      </p:sp>
     </p:spTree>
     <p:extLst>
       <p:ext uri="{BB962C8B-B14F-4D97-AF65-F5344CB8AC3E}">
-        <p14:creationId xmlns:p14="http://schemas.microsoft.com/office/powerpoint/2010/main" val="3583108191"/>
+        <p14:creationId xmlns:p14="http://schemas.microsoft.com/office/powerpoint/2010/main" val="1404766497"/>
       </p:ext>
     </p:extLst>
   </p:cSld>
@@ -4352,6 +4172,555 @@
           <a:p>
             <a:r>
               <a:rPr lang="en-US" dirty="0" smtClean="0"/>
+              <a:t>Demo</a:t>
+            </a:r>
+            <a:endParaRPr lang="en-US" dirty="0"/>
+          </a:p>
+        </p:txBody>
+      </p:sp>
+      <p:sp>
+        <p:nvSpPr>
+          <p:cNvPr id="3" name="Content Placeholder 2"/>
+          <p:cNvSpPr>
+            <a:spLocks noGrp="1"/>
+          </p:cNvSpPr>
+          <p:nvPr>
+            <p:ph idx="1"/>
+          </p:nvPr>
+        </p:nvSpPr>
+        <p:spPr/>
+        <p:txBody>
+          <a:bodyPr/>
+          <a:lstStyle/>
+          <a:p>
+            <a:endParaRPr lang="en-US" dirty="0"/>
+          </a:p>
+        </p:txBody>
+      </p:sp>
+      <p:sp>
+        <p:nvSpPr>
+          <p:cNvPr id="4" name="Flowchart: Magnetic Disk 3"/>
+          <p:cNvSpPr/>
+          <p:nvPr/>
+        </p:nvSpPr>
+        <p:spPr>
+          <a:xfrm>
+            <a:off x="2432116" y="3875988"/>
+            <a:ext cx="1376313" cy="1838227"/>
+          </a:xfrm>
+          <a:prstGeom prst="flowChartMagneticDisk">
+            <a:avLst/>
+          </a:prstGeom>
+        </p:spPr>
+        <p:style>
+          <a:lnRef idx="2">
+            <a:schemeClr val="accent1">
+              <a:shade val="50000"/>
+            </a:schemeClr>
+          </a:lnRef>
+          <a:fillRef idx="1">
+            <a:schemeClr val="accent1"/>
+          </a:fillRef>
+          <a:effectRef idx="0">
+            <a:schemeClr val="accent1"/>
+          </a:effectRef>
+          <a:fontRef idx="minor">
+            <a:schemeClr val="lt1"/>
+          </a:fontRef>
+        </p:style>
+        <p:txBody>
+          <a:bodyPr rtlCol="0" anchor="ctr"/>
+          <a:lstStyle/>
+          <a:p>
+            <a:pPr algn="ctr"/>
+            <a:r>
+              <a:rPr lang="en-US" dirty="0" smtClean="0"/>
+              <a:t>PG 10</a:t>
+            </a:r>
+            <a:endParaRPr lang="en-US" dirty="0"/>
+          </a:p>
+        </p:txBody>
+      </p:sp>
+      <p:sp>
+        <p:nvSpPr>
+          <p:cNvPr id="5" name="Flowchart: Magnetic Disk 4"/>
+          <p:cNvSpPr/>
+          <p:nvPr/>
+        </p:nvSpPr>
+        <p:spPr>
+          <a:xfrm>
+            <a:off x="7495881" y="3875988"/>
+            <a:ext cx="1376313" cy="1838227"/>
+          </a:xfrm>
+          <a:prstGeom prst="flowChartMagneticDisk">
+            <a:avLst/>
+          </a:prstGeom>
+        </p:spPr>
+        <p:style>
+          <a:lnRef idx="2">
+            <a:schemeClr val="accent1">
+              <a:shade val="50000"/>
+            </a:schemeClr>
+          </a:lnRef>
+          <a:fillRef idx="1">
+            <a:schemeClr val="accent1"/>
+          </a:fillRef>
+          <a:effectRef idx="0">
+            <a:schemeClr val="accent1"/>
+          </a:effectRef>
+          <a:fontRef idx="minor">
+            <a:schemeClr val="lt1"/>
+          </a:fontRef>
+        </p:style>
+        <p:txBody>
+          <a:bodyPr rtlCol="0" anchor="ctr"/>
+          <a:lstStyle/>
+          <a:p>
+            <a:pPr algn="ctr"/>
+            <a:r>
+              <a:rPr lang="en-US" dirty="0" smtClean="0"/>
+              <a:t>PG 11</a:t>
+            </a:r>
+            <a:endParaRPr lang="en-US" dirty="0"/>
+          </a:p>
+        </p:txBody>
+      </p:sp>
+      <p:sp>
+        <p:nvSpPr>
+          <p:cNvPr id="6" name="Striped Right Arrow 5"/>
+          <p:cNvSpPr/>
+          <p:nvPr/>
+        </p:nvSpPr>
+        <p:spPr>
+          <a:xfrm>
+            <a:off x="5064551" y="4418028"/>
+            <a:ext cx="1175208" cy="754145"/>
+          </a:xfrm>
+          <a:prstGeom prst="stripedRightArrow">
+            <a:avLst/>
+          </a:prstGeom>
+        </p:spPr>
+        <p:style>
+          <a:lnRef idx="2">
+            <a:schemeClr val="accent1">
+              <a:shade val="50000"/>
+            </a:schemeClr>
+          </a:lnRef>
+          <a:fillRef idx="1">
+            <a:schemeClr val="accent1"/>
+          </a:fillRef>
+          <a:effectRef idx="0">
+            <a:schemeClr val="accent1"/>
+          </a:effectRef>
+          <a:fontRef idx="minor">
+            <a:schemeClr val="lt1"/>
+          </a:fontRef>
+        </p:style>
+        <p:txBody>
+          <a:bodyPr rtlCol="0" anchor="ctr"/>
+          <a:lstStyle/>
+          <a:p>
+            <a:pPr algn="ctr"/>
+            <a:endParaRPr lang="en-US"/>
+          </a:p>
+        </p:txBody>
+      </p:sp>
+      <p:sp>
+        <p:nvSpPr>
+          <p:cNvPr id="7" name="Rounded Rectangle 6"/>
+          <p:cNvSpPr/>
+          <p:nvPr/>
+        </p:nvSpPr>
+        <p:spPr>
+          <a:xfrm>
+            <a:off x="4572000" y="2677947"/>
+            <a:ext cx="2007909" cy="886120"/>
+          </a:xfrm>
+          <a:prstGeom prst="roundRect">
+            <a:avLst/>
+          </a:prstGeom>
+        </p:spPr>
+        <p:style>
+          <a:lnRef idx="2">
+            <a:schemeClr val="accent6">
+              <a:shade val="50000"/>
+            </a:schemeClr>
+          </a:lnRef>
+          <a:fillRef idx="1">
+            <a:schemeClr val="accent6"/>
+          </a:fillRef>
+          <a:effectRef idx="0">
+            <a:schemeClr val="accent6"/>
+          </a:effectRef>
+          <a:fontRef idx="minor">
+            <a:schemeClr val="lt1"/>
+          </a:fontRef>
+        </p:style>
+        <p:txBody>
+          <a:bodyPr rtlCol="0" anchor="ctr"/>
+          <a:lstStyle/>
+          <a:p>
+            <a:pPr algn="ctr"/>
+            <a:r>
+              <a:rPr lang="en-US" dirty="0" err="1" smtClean="0"/>
+              <a:t>HAProxy</a:t>
+            </a:r>
+            <a:endParaRPr lang="en-US" dirty="0"/>
+          </a:p>
+        </p:txBody>
+      </p:sp>
+      <p:sp>
+        <p:nvSpPr>
+          <p:cNvPr id="8" name="Rounded Rectangle 7"/>
+          <p:cNvSpPr/>
+          <p:nvPr/>
+        </p:nvSpPr>
+        <p:spPr>
+          <a:xfrm>
+            <a:off x="4647414" y="1753386"/>
+            <a:ext cx="1932495" cy="471340"/>
+          </a:xfrm>
+          <a:prstGeom prst="roundRect">
+            <a:avLst/>
+          </a:prstGeom>
+        </p:spPr>
+        <p:style>
+          <a:lnRef idx="2">
+            <a:schemeClr val="accent1">
+              <a:shade val="50000"/>
+            </a:schemeClr>
+          </a:lnRef>
+          <a:fillRef idx="1">
+            <a:schemeClr val="accent1"/>
+          </a:fillRef>
+          <a:effectRef idx="0">
+            <a:schemeClr val="accent1"/>
+          </a:effectRef>
+          <a:fontRef idx="minor">
+            <a:schemeClr val="lt1"/>
+          </a:fontRef>
+        </p:style>
+        <p:txBody>
+          <a:bodyPr rtlCol="0" anchor="ctr"/>
+          <a:lstStyle/>
+          <a:p>
+            <a:pPr algn="ctr"/>
+            <a:r>
+              <a:rPr lang="en-US" dirty="0" smtClean="0"/>
+              <a:t>PGAdmin4</a:t>
+            </a:r>
+            <a:endParaRPr lang="en-US" dirty="0"/>
+          </a:p>
+        </p:txBody>
+      </p:sp>
+      <p:sp>
+        <p:nvSpPr>
+          <p:cNvPr id="10" name="Down Arrow 9"/>
+          <p:cNvSpPr/>
+          <p:nvPr/>
+        </p:nvSpPr>
+        <p:spPr>
+          <a:xfrm>
+            <a:off x="5498182" y="2278981"/>
+            <a:ext cx="230957" cy="349526"/>
+          </a:xfrm>
+          <a:prstGeom prst="downArrow">
+            <a:avLst/>
+          </a:prstGeom>
+        </p:spPr>
+        <p:style>
+          <a:lnRef idx="2">
+            <a:schemeClr val="accent1">
+              <a:shade val="50000"/>
+            </a:schemeClr>
+          </a:lnRef>
+          <a:fillRef idx="1">
+            <a:schemeClr val="accent1"/>
+          </a:fillRef>
+          <a:effectRef idx="0">
+            <a:schemeClr val="accent1"/>
+          </a:effectRef>
+          <a:fontRef idx="minor">
+            <a:schemeClr val="lt1"/>
+          </a:fontRef>
+        </p:style>
+        <p:txBody>
+          <a:bodyPr rtlCol="0" anchor="ctr"/>
+          <a:lstStyle/>
+          <a:p>
+            <a:pPr algn="ctr"/>
+            <a:endParaRPr lang="en-US"/>
+          </a:p>
+        </p:txBody>
+      </p:sp>
+      <p:sp>
+        <p:nvSpPr>
+          <p:cNvPr id="11" name="Down Arrow 10"/>
+          <p:cNvSpPr/>
+          <p:nvPr/>
+        </p:nvSpPr>
+        <p:spPr>
+          <a:xfrm rot="3544126">
+            <a:off x="3774181" y="2926591"/>
+            <a:ext cx="245097" cy="1111627"/>
+          </a:xfrm>
+          <a:prstGeom prst="downArrow">
+            <a:avLst/>
+          </a:prstGeom>
+        </p:spPr>
+        <p:style>
+          <a:lnRef idx="2">
+            <a:schemeClr val="accent1">
+              <a:shade val="50000"/>
+            </a:schemeClr>
+          </a:lnRef>
+          <a:fillRef idx="1">
+            <a:schemeClr val="accent1"/>
+          </a:fillRef>
+          <a:effectRef idx="0">
+            <a:schemeClr val="accent1"/>
+          </a:effectRef>
+          <a:fontRef idx="minor">
+            <a:schemeClr val="lt1"/>
+          </a:fontRef>
+        </p:style>
+        <p:txBody>
+          <a:bodyPr rtlCol="0" anchor="ctr"/>
+          <a:lstStyle/>
+          <a:p>
+            <a:pPr algn="ctr"/>
+            <a:endParaRPr lang="en-US"/>
+          </a:p>
+        </p:txBody>
+      </p:sp>
+      <p:sp>
+        <p:nvSpPr>
+          <p:cNvPr id="12" name="Right Arrow 11"/>
+          <p:cNvSpPr/>
+          <p:nvPr/>
+        </p:nvSpPr>
+        <p:spPr>
+          <a:xfrm rot="2291273">
+            <a:off x="6693030" y="3397152"/>
+            <a:ext cx="1066800" cy="226243"/>
+          </a:xfrm>
+          <a:prstGeom prst="rightArrow">
+            <a:avLst/>
+          </a:prstGeom>
+        </p:spPr>
+        <p:style>
+          <a:lnRef idx="2">
+            <a:schemeClr val="accent1">
+              <a:shade val="50000"/>
+            </a:schemeClr>
+          </a:lnRef>
+          <a:fillRef idx="1">
+            <a:schemeClr val="accent1"/>
+          </a:fillRef>
+          <a:effectRef idx="0">
+            <a:schemeClr val="accent1"/>
+          </a:effectRef>
+          <a:fontRef idx="minor">
+            <a:schemeClr val="lt1"/>
+          </a:fontRef>
+        </p:style>
+        <p:txBody>
+          <a:bodyPr rtlCol="0" anchor="ctr"/>
+          <a:lstStyle/>
+          <a:p>
+            <a:pPr algn="ctr"/>
+            <a:endParaRPr lang="en-US"/>
+          </a:p>
+        </p:txBody>
+      </p:sp>
+      <p:sp>
+        <p:nvSpPr>
+          <p:cNvPr id="9" name="&quot;No&quot; Symbol 8"/>
+          <p:cNvSpPr/>
+          <p:nvPr/>
+        </p:nvSpPr>
+        <p:spPr>
+          <a:xfrm>
+            <a:off x="2191732" y="3902470"/>
+            <a:ext cx="1857080" cy="1785259"/>
+          </a:xfrm>
+          <a:prstGeom prst="noSmoking">
+            <a:avLst/>
+          </a:prstGeom>
+          <a:solidFill>
+            <a:schemeClr val="accent2"/>
+          </a:solidFill>
+        </p:spPr>
+        <p:style>
+          <a:lnRef idx="2">
+            <a:schemeClr val="accent1">
+              <a:shade val="50000"/>
+            </a:schemeClr>
+          </a:lnRef>
+          <a:fillRef idx="1">
+            <a:schemeClr val="accent1"/>
+          </a:fillRef>
+          <a:effectRef idx="0">
+            <a:schemeClr val="accent1"/>
+          </a:effectRef>
+          <a:fontRef idx="minor">
+            <a:schemeClr val="lt1"/>
+          </a:fontRef>
+        </p:style>
+        <p:txBody>
+          <a:bodyPr rtlCol="0" anchor="ctr"/>
+          <a:lstStyle/>
+          <a:p>
+            <a:pPr algn="ctr"/>
+            <a:endParaRPr lang="en-US">
+              <a:solidFill>
+                <a:schemeClr val="tx1"/>
+              </a:solidFill>
+            </a:endParaRPr>
+          </a:p>
+        </p:txBody>
+      </p:sp>
+      <p:sp>
+        <p:nvSpPr>
+          <p:cNvPr id="13" name="&quot;No&quot; Symbol 12"/>
+          <p:cNvSpPr/>
+          <p:nvPr/>
+        </p:nvSpPr>
+        <p:spPr>
+          <a:xfrm>
+            <a:off x="3690991" y="3225799"/>
+            <a:ext cx="411476" cy="431612"/>
+          </a:xfrm>
+          <a:prstGeom prst="noSmoking">
+            <a:avLst/>
+          </a:prstGeom>
+          <a:solidFill>
+            <a:schemeClr val="accent2"/>
+          </a:solidFill>
+        </p:spPr>
+        <p:style>
+          <a:lnRef idx="2">
+            <a:schemeClr val="accent1">
+              <a:shade val="50000"/>
+            </a:schemeClr>
+          </a:lnRef>
+          <a:fillRef idx="1">
+            <a:schemeClr val="accent1"/>
+          </a:fillRef>
+          <a:effectRef idx="0">
+            <a:schemeClr val="accent1"/>
+          </a:effectRef>
+          <a:fontRef idx="minor">
+            <a:schemeClr val="lt1"/>
+          </a:fontRef>
+        </p:style>
+        <p:txBody>
+          <a:bodyPr rtlCol="0" anchor="ctr"/>
+          <a:lstStyle/>
+          <a:p>
+            <a:pPr algn="ctr"/>
+            <a:endParaRPr lang="en-US">
+              <a:solidFill>
+                <a:schemeClr val="tx1"/>
+              </a:solidFill>
+            </a:endParaRPr>
+          </a:p>
+        </p:txBody>
+      </p:sp>
+      <p:sp>
+        <p:nvSpPr>
+          <p:cNvPr id="14" name="&quot;No&quot; Symbol 13"/>
+          <p:cNvSpPr/>
+          <p:nvPr/>
+        </p:nvSpPr>
+        <p:spPr>
+          <a:xfrm>
+            <a:off x="5090667" y="4363542"/>
+            <a:ext cx="845107" cy="863113"/>
+          </a:xfrm>
+          <a:prstGeom prst="noSmoking">
+            <a:avLst/>
+          </a:prstGeom>
+          <a:solidFill>
+            <a:schemeClr val="accent2"/>
+          </a:solidFill>
+        </p:spPr>
+        <p:style>
+          <a:lnRef idx="2">
+            <a:schemeClr val="accent1">
+              <a:shade val="50000"/>
+            </a:schemeClr>
+          </a:lnRef>
+          <a:fillRef idx="1">
+            <a:schemeClr val="accent1"/>
+          </a:fillRef>
+          <a:effectRef idx="0">
+            <a:schemeClr val="accent1"/>
+          </a:effectRef>
+          <a:fontRef idx="minor">
+            <a:schemeClr val="lt1"/>
+          </a:fontRef>
+        </p:style>
+        <p:txBody>
+          <a:bodyPr rtlCol="0" anchor="ctr"/>
+          <a:lstStyle/>
+          <a:p>
+            <a:pPr algn="ctr"/>
+            <a:endParaRPr lang="en-US">
+              <a:solidFill>
+                <a:schemeClr val="tx1"/>
+              </a:solidFill>
+            </a:endParaRPr>
+          </a:p>
+        </p:txBody>
+      </p:sp>
+    </p:spTree>
+    <p:extLst>
+      <p:ext uri="{BB962C8B-B14F-4D97-AF65-F5344CB8AC3E}">
+        <p14:creationId xmlns:p14="http://schemas.microsoft.com/office/powerpoint/2010/main" val="3583108191"/>
+      </p:ext>
+    </p:extLst>
+  </p:cSld>
+  <p:clrMapOvr>
+    <a:masterClrMapping/>
+  </p:clrMapOvr>
+</p:sld>
+</file>
+
+<file path=ppt/slides/slide12.xml><?xml version="1.0" encoding="utf-8"?>
+<p:sld xmlns:a="http://schemas.openxmlformats.org/drawingml/2006/main" xmlns:r="http://schemas.openxmlformats.org/officeDocument/2006/relationships" xmlns:p="http://schemas.openxmlformats.org/presentationml/2006/main">
+  <p:cSld>
+    <p:spTree>
+      <p:nvGrpSpPr>
+        <p:cNvPr id="1" name=""/>
+        <p:cNvGrpSpPr/>
+        <p:nvPr/>
+      </p:nvGrpSpPr>
+      <p:grpSpPr>
+        <a:xfrm>
+          <a:off x="0" y="0"/>
+          <a:ext cx="0" cy="0"/>
+          <a:chOff x="0" y="0"/>
+          <a:chExt cx="0" cy="0"/>
+        </a:xfrm>
+      </p:grpSpPr>
+      <p:sp>
+        <p:nvSpPr>
+          <p:cNvPr id="2" name="Title 1"/>
+          <p:cNvSpPr>
+            <a:spLocks noGrp="1"/>
+          </p:cNvSpPr>
+          <p:nvPr>
+            <p:ph type="title"/>
+          </p:nvPr>
+        </p:nvSpPr>
+        <p:spPr/>
+        <p:txBody>
+          <a:bodyPr/>
+          <a:lstStyle/>
+          <a:p>
+            <a:r>
+              <a:rPr lang="en-US" dirty="0" smtClean="0"/>
               <a:t>Do try this at home</a:t>
             </a:r>
             <a:endParaRPr lang="en-US" dirty="0"/>
@@ -4413,7 +4782,7 @@
 </p:sld>
 </file>
 
-<file path=ppt/slides/slide12.xml><?xml version="1.0" encoding="utf-8"?>
+<file path=ppt/slides/slide13.xml><?xml version="1.0" encoding="utf-8"?>
 <p:sld xmlns:a="http://schemas.openxmlformats.org/drawingml/2006/main" xmlns:r="http://schemas.openxmlformats.org/officeDocument/2006/relationships" xmlns:p="http://schemas.openxmlformats.org/presentationml/2006/main">
   <p:cSld>
     <p:spTree>
@@ -4564,8 +4933,27 @@
             </a:r>
             <a:r>
               <a:rPr lang="en-US" dirty="0" smtClean="0"/>
-              <a:t> since 2011</a:t>
-            </a:r>
+              <a:t> since </a:t>
+            </a:r>
+            <a:r>
+              <a:rPr lang="en-US" dirty="0" smtClean="0"/>
+              <a:t>2011:</a:t>
+            </a:r>
+          </a:p>
+          <a:p>
+            <a:pPr lvl="1"/>
+            <a:r>
+              <a:rPr lang="en-US" dirty="0" smtClean="0"/>
+              <a:t>Alfresco services</a:t>
+            </a:r>
+          </a:p>
+          <a:p>
+            <a:pPr lvl="1"/>
+            <a:r>
+              <a:rPr lang="en-US" dirty="0" smtClean="0"/>
+              <a:t>Products</a:t>
+            </a:r>
+            <a:endParaRPr lang="en-US" dirty="0" smtClean="0"/>
           </a:p>
           <a:p>
             <a:r>
@@ -5326,7 +5714,7 @@
           <a:p>
             <a:r>
               <a:rPr lang="en-US" dirty="0" smtClean="0"/>
-              <a:t>History</a:t>
+              <a:t>Limitations</a:t>
             </a:r>
             <a:endParaRPr lang="en-US" dirty="0"/>
           </a:p>
@@ -5349,53 +5737,19 @@
           <a:p>
             <a:r>
               <a:rPr lang="en-US" dirty="0" smtClean="0"/>
-              <a:t>Trigger based solutions</a:t>
-            </a:r>
-          </a:p>
-          <a:p>
-            <a:pPr lvl="1"/>
-            <a:r>
-              <a:rPr lang="en-US" dirty="0" err="1" smtClean="0"/>
-              <a:t>Slony</a:t>
-            </a:r>
-            <a:endParaRPr lang="en-US" dirty="0" smtClean="0"/>
-          </a:p>
-          <a:p>
-            <a:pPr lvl="1"/>
-            <a:r>
-              <a:rPr lang="en-US" dirty="0" err="1" smtClean="0"/>
-              <a:t>Londiste</a:t>
-            </a:r>
-            <a:endParaRPr lang="en-US" dirty="0" smtClean="0"/>
-          </a:p>
-          <a:p>
-            <a:r>
-              <a:rPr lang="en-US" dirty="0" err="1" smtClean="0"/>
-              <a:t>Pglogical</a:t>
-            </a:r>
+              <a:t>No DDLS</a:t>
+            </a:r>
+          </a:p>
+          <a:p>
             <a:r>
               <a:rPr lang="en-US" dirty="0" smtClean="0"/>
-              <a:t> extension</a:t>
-            </a:r>
-          </a:p>
-          <a:p>
-            <a:pPr lvl="1"/>
+              <a:t>No Sequences</a:t>
+            </a:r>
+          </a:p>
+          <a:p>
             <a:r>
               <a:rPr lang="en-US" dirty="0" smtClean="0"/>
-              <a:t>&gt; PG 9.4</a:t>
-            </a:r>
-          </a:p>
-          <a:p>
-            <a:r>
-              <a:rPr lang="en-US" dirty="0" smtClean="0"/>
-              <a:t>Built in logical replication</a:t>
-            </a:r>
-          </a:p>
-          <a:p>
-            <a:pPr lvl="1"/>
-            <a:r>
-              <a:rPr lang="en-US" dirty="0" smtClean="0"/>
-              <a:t>Introduced in PG 10</a:t>
+              <a:t>Tables only</a:t>
             </a:r>
             <a:endParaRPr lang="en-US" dirty="0"/>
           </a:p>
@@ -5404,7 +5758,7 @@
     </p:spTree>
     <p:extLst>
       <p:ext uri="{BB962C8B-B14F-4D97-AF65-F5344CB8AC3E}">
-        <p14:creationId xmlns:p14="http://schemas.microsoft.com/office/powerpoint/2010/main" val="2101205648"/>
+        <p14:creationId xmlns:p14="http://schemas.microsoft.com/office/powerpoint/2010/main" val="548127608"/>
       </p:ext>
     </p:extLst>
   </p:cSld>
@@ -5448,7 +5802,7 @@
           <a:p>
             <a:r>
               <a:rPr lang="en-US" dirty="0" smtClean="0"/>
-              <a:t>Demo</a:t>
+              <a:t>History</a:t>
             </a:r>
             <a:endParaRPr lang="en-US" dirty="0"/>
           </a:p>
@@ -5469,270 +5823,64 @@
           <a:bodyPr/>
           <a:lstStyle/>
           <a:p>
+            <a:r>
+              <a:rPr lang="en-US" dirty="0" smtClean="0"/>
+              <a:t>Trigger based solutions</a:t>
+            </a:r>
+          </a:p>
+          <a:p>
+            <a:pPr lvl="1"/>
+            <a:r>
+              <a:rPr lang="en-US" dirty="0" err="1" smtClean="0"/>
+              <a:t>Slony</a:t>
+            </a:r>
+            <a:endParaRPr lang="en-US" dirty="0" smtClean="0"/>
+          </a:p>
+          <a:p>
+            <a:pPr lvl="1"/>
+            <a:r>
+              <a:rPr lang="en-US" dirty="0" err="1" smtClean="0"/>
+              <a:t>Londiste</a:t>
+            </a:r>
+            <a:endParaRPr lang="en-US" dirty="0" smtClean="0"/>
+          </a:p>
+          <a:p>
+            <a:r>
+              <a:rPr lang="en-US" dirty="0" err="1" smtClean="0"/>
+              <a:t>Pglogical</a:t>
+            </a:r>
+            <a:r>
+              <a:rPr lang="en-US" dirty="0" smtClean="0"/>
+              <a:t> extension</a:t>
+            </a:r>
+          </a:p>
+          <a:p>
+            <a:pPr lvl="1"/>
+            <a:r>
+              <a:rPr lang="en-US" dirty="0" smtClean="0"/>
+              <a:t>&gt; PG 9.4</a:t>
+            </a:r>
+          </a:p>
+          <a:p>
+            <a:r>
+              <a:rPr lang="en-US" dirty="0" smtClean="0"/>
+              <a:t>Built in logical replication</a:t>
+            </a:r>
+          </a:p>
+          <a:p>
+            <a:pPr lvl="1"/>
+            <a:r>
+              <a:rPr lang="en-US" dirty="0" smtClean="0"/>
+              <a:t>Introduced in PG 10</a:t>
+            </a:r>
             <a:endParaRPr lang="en-US" dirty="0"/>
-          </a:p>
-        </p:txBody>
-      </p:sp>
-      <p:sp>
-        <p:nvSpPr>
-          <p:cNvPr id="4" name="Flowchart: Magnetic Disk 3"/>
-          <p:cNvSpPr/>
-          <p:nvPr/>
-        </p:nvSpPr>
-        <p:spPr>
-          <a:xfrm>
-            <a:off x="2432116" y="3875988"/>
-            <a:ext cx="1376313" cy="1838227"/>
-          </a:xfrm>
-          <a:prstGeom prst="flowChartMagneticDisk">
-            <a:avLst/>
-          </a:prstGeom>
-        </p:spPr>
-        <p:style>
-          <a:lnRef idx="2">
-            <a:schemeClr val="accent1">
-              <a:shade val="50000"/>
-            </a:schemeClr>
-          </a:lnRef>
-          <a:fillRef idx="1">
-            <a:schemeClr val="accent1"/>
-          </a:fillRef>
-          <a:effectRef idx="0">
-            <a:schemeClr val="accent1"/>
-          </a:effectRef>
-          <a:fontRef idx="minor">
-            <a:schemeClr val="lt1"/>
-          </a:fontRef>
-        </p:style>
-        <p:txBody>
-          <a:bodyPr rtlCol="0" anchor="ctr"/>
-          <a:lstStyle/>
-          <a:p>
-            <a:pPr algn="ctr"/>
-            <a:r>
-              <a:rPr lang="en-US" dirty="0" smtClean="0"/>
-              <a:t>PG 10</a:t>
-            </a:r>
-            <a:endParaRPr lang="en-US" dirty="0"/>
-          </a:p>
-        </p:txBody>
-      </p:sp>
-      <p:sp>
-        <p:nvSpPr>
-          <p:cNvPr id="5" name="Flowchart: Magnetic Disk 4"/>
-          <p:cNvSpPr/>
-          <p:nvPr/>
-        </p:nvSpPr>
-        <p:spPr>
-          <a:xfrm>
-            <a:off x="7495881" y="3875988"/>
-            <a:ext cx="1376313" cy="1838227"/>
-          </a:xfrm>
-          <a:prstGeom prst="flowChartMagneticDisk">
-            <a:avLst/>
-          </a:prstGeom>
-        </p:spPr>
-        <p:style>
-          <a:lnRef idx="2">
-            <a:schemeClr val="accent1">
-              <a:shade val="50000"/>
-            </a:schemeClr>
-          </a:lnRef>
-          <a:fillRef idx="1">
-            <a:schemeClr val="accent1"/>
-          </a:fillRef>
-          <a:effectRef idx="0">
-            <a:schemeClr val="accent1"/>
-          </a:effectRef>
-          <a:fontRef idx="minor">
-            <a:schemeClr val="lt1"/>
-          </a:fontRef>
-        </p:style>
-        <p:txBody>
-          <a:bodyPr rtlCol="0" anchor="ctr"/>
-          <a:lstStyle/>
-          <a:p>
-            <a:pPr algn="ctr"/>
-            <a:r>
-              <a:rPr lang="en-US" dirty="0" smtClean="0"/>
-              <a:t>PG 11</a:t>
-            </a:r>
-            <a:endParaRPr lang="en-US" dirty="0"/>
-          </a:p>
-        </p:txBody>
-      </p:sp>
-      <p:sp>
-        <p:nvSpPr>
-          <p:cNvPr id="7" name="Rounded Rectangle 6"/>
-          <p:cNvSpPr/>
-          <p:nvPr/>
-        </p:nvSpPr>
-        <p:spPr>
-          <a:xfrm>
-            <a:off x="4572000" y="2677947"/>
-            <a:ext cx="2007909" cy="886120"/>
-          </a:xfrm>
-          <a:prstGeom prst="roundRect">
-            <a:avLst/>
-          </a:prstGeom>
-        </p:spPr>
-        <p:style>
-          <a:lnRef idx="2">
-            <a:schemeClr val="accent6">
-              <a:shade val="50000"/>
-            </a:schemeClr>
-          </a:lnRef>
-          <a:fillRef idx="1">
-            <a:schemeClr val="accent6"/>
-          </a:fillRef>
-          <a:effectRef idx="0">
-            <a:schemeClr val="accent6"/>
-          </a:effectRef>
-          <a:fontRef idx="minor">
-            <a:schemeClr val="lt1"/>
-          </a:fontRef>
-        </p:style>
-        <p:txBody>
-          <a:bodyPr rtlCol="0" anchor="ctr"/>
-          <a:lstStyle/>
-          <a:p>
-            <a:pPr algn="ctr"/>
-            <a:r>
-              <a:rPr lang="en-US" dirty="0" err="1" smtClean="0"/>
-              <a:t>HAProxy</a:t>
-            </a:r>
-            <a:endParaRPr lang="en-US" dirty="0"/>
-          </a:p>
-        </p:txBody>
-      </p:sp>
-      <p:sp>
-        <p:nvSpPr>
-          <p:cNvPr id="8" name="Rounded Rectangle 7"/>
-          <p:cNvSpPr/>
-          <p:nvPr/>
-        </p:nvSpPr>
-        <p:spPr>
-          <a:xfrm>
-            <a:off x="4647414" y="1753386"/>
-            <a:ext cx="1932495" cy="471340"/>
-          </a:xfrm>
-          <a:prstGeom prst="roundRect">
-            <a:avLst/>
-          </a:prstGeom>
-        </p:spPr>
-        <p:style>
-          <a:lnRef idx="2">
-            <a:schemeClr val="accent1">
-              <a:shade val="50000"/>
-            </a:schemeClr>
-          </a:lnRef>
-          <a:fillRef idx="1">
-            <a:schemeClr val="accent1"/>
-          </a:fillRef>
-          <a:effectRef idx="0">
-            <a:schemeClr val="accent1"/>
-          </a:effectRef>
-          <a:fontRef idx="minor">
-            <a:schemeClr val="lt1"/>
-          </a:fontRef>
-        </p:style>
-        <p:txBody>
-          <a:bodyPr rtlCol="0" anchor="ctr"/>
-          <a:lstStyle/>
-          <a:p>
-            <a:pPr algn="ctr"/>
-            <a:r>
-              <a:rPr lang="en-US" dirty="0" smtClean="0"/>
-              <a:t>PGAdmin4</a:t>
-            </a:r>
-            <a:endParaRPr lang="en-US" dirty="0"/>
-          </a:p>
-        </p:txBody>
-      </p:sp>
-      <p:sp>
-        <p:nvSpPr>
-          <p:cNvPr id="10" name="Down Arrow 9"/>
-          <p:cNvSpPr/>
-          <p:nvPr/>
-        </p:nvSpPr>
-        <p:spPr>
-          <a:xfrm>
-            <a:off x="5498182" y="2278981"/>
-            <a:ext cx="230957" cy="349526"/>
-          </a:xfrm>
-          <a:prstGeom prst="downArrow">
-            <a:avLst/>
-          </a:prstGeom>
-        </p:spPr>
-        <p:style>
-          <a:lnRef idx="2">
-            <a:schemeClr val="accent1">
-              <a:shade val="50000"/>
-            </a:schemeClr>
-          </a:lnRef>
-          <a:fillRef idx="1">
-            <a:schemeClr val="accent1"/>
-          </a:fillRef>
-          <a:effectRef idx="0">
-            <a:schemeClr val="accent1"/>
-          </a:effectRef>
-          <a:fontRef idx="minor">
-            <a:schemeClr val="lt1"/>
-          </a:fontRef>
-        </p:style>
-        <p:txBody>
-          <a:bodyPr rtlCol="0" anchor="ctr"/>
-          <a:lstStyle/>
-          <a:p>
-            <a:pPr algn="ctr"/>
-            <a:endParaRPr lang="en-US"/>
-          </a:p>
-        </p:txBody>
-      </p:sp>
-      <p:sp>
-        <p:nvSpPr>
-          <p:cNvPr id="11" name="Down Arrow 10"/>
-          <p:cNvSpPr/>
-          <p:nvPr/>
-        </p:nvSpPr>
-        <p:spPr>
-          <a:xfrm rot="3544126">
-            <a:off x="3774181" y="2926591"/>
-            <a:ext cx="245097" cy="1111627"/>
-          </a:xfrm>
-          <a:prstGeom prst="downArrow">
-            <a:avLst/>
-          </a:prstGeom>
-        </p:spPr>
-        <p:style>
-          <a:lnRef idx="2">
-            <a:schemeClr val="accent1">
-              <a:shade val="50000"/>
-            </a:schemeClr>
-          </a:lnRef>
-          <a:fillRef idx="1">
-            <a:schemeClr val="accent1"/>
-          </a:fillRef>
-          <a:effectRef idx="0">
-            <a:schemeClr val="accent1"/>
-          </a:effectRef>
-          <a:fontRef idx="minor">
-            <a:schemeClr val="lt1"/>
-          </a:fontRef>
-        </p:style>
-        <p:txBody>
-          <a:bodyPr rtlCol="0" anchor="ctr"/>
-          <a:lstStyle/>
-          <a:p>
-            <a:pPr algn="ctr"/>
-            <a:endParaRPr lang="en-US"/>
           </a:p>
         </p:txBody>
       </p:sp>
     </p:spTree>
     <p:extLst>
       <p:ext uri="{BB962C8B-B14F-4D97-AF65-F5344CB8AC3E}">
-        <p14:creationId xmlns:p14="http://schemas.microsoft.com/office/powerpoint/2010/main" val="4283612801"/>
+        <p14:creationId xmlns:p14="http://schemas.microsoft.com/office/powerpoint/2010/main" val="2101205648"/>
       </p:ext>
     </p:extLst>
   </p:cSld>
@@ -5891,16 +6039,60 @@
       </p:sp>
       <p:sp>
         <p:nvSpPr>
-          <p:cNvPr id="6" name="Striped Right Arrow 5"/>
+          <p:cNvPr id="7" name="Rounded Rectangle 6"/>
           <p:cNvSpPr/>
           <p:nvPr/>
         </p:nvSpPr>
         <p:spPr>
           <a:xfrm>
-            <a:off x="5064551" y="4418028"/>
-            <a:ext cx="1175208" cy="754145"/>
-          </a:xfrm>
-          <a:prstGeom prst="stripedRightArrow">
+            <a:off x="4572000" y="2677947"/>
+            <a:ext cx="2007909" cy="886120"/>
+          </a:xfrm>
+          <a:prstGeom prst="roundRect">
+            <a:avLst/>
+          </a:prstGeom>
+        </p:spPr>
+        <p:style>
+          <a:lnRef idx="2">
+            <a:schemeClr val="accent6">
+              <a:shade val="50000"/>
+            </a:schemeClr>
+          </a:lnRef>
+          <a:fillRef idx="1">
+            <a:schemeClr val="accent6"/>
+          </a:fillRef>
+          <a:effectRef idx="0">
+            <a:schemeClr val="accent6"/>
+          </a:effectRef>
+          <a:fontRef idx="minor">
+            <a:schemeClr val="lt1"/>
+          </a:fontRef>
+        </p:style>
+        <p:txBody>
+          <a:bodyPr rtlCol="0" anchor="ctr"/>
+          <a:lstStyle/>
+          <a:p>
+            <a:pPr algn="ctr"/>
+            <a:r>
+              <a:rPr lang="en-US" dirty="0" err="1" smtClean="0"/>
+              <a:t>HAProxy</a:t>
+            </a:r>
+            <a:endParaRPr lang="en-US" dirty="0"/>
+          </a:p>
+        </p:txBody>
+      </p:sp>
+      <p:sp>
+        <p:nvSpPr>
+          <p:cNvPr id="8" name="Rounded Rectangle 7"/>
+          <p:cNvSpPr/>
+          <p:nvPr/>
+        </p:nvSpPr>
+        <p:spPr>
+          <a:xfrm>
+            <a:off x="4647414" y="1753386"/>
+            <a:ext cx="1932495" cy="471340"/>
+          </a:xfrm>
+          <a:prstGeom prst="roundRect">
             <a:avLst/>
           </a:prstGeom>
         </p:spPr>
@@ -5925,66 +6117,26 @@
           <a:lstStyle/>
           <a:p>
             <a:pPr algn="ctr"/>
-            <a:endParaRPr lang="en-US"/>
-          </a:p>
-        </p:txBody>
-      </p:sp>
-      <p:sp>
-        <p:nvSpPr>
-          <p:cNvPr id="7" name="Rounded Rectangle 6"/>
+            <a:r>
+              <a:rPr lang="en-US" dirty="0" smtClean="0"/>
+              <a:t>PGAdmin4</a:t>
+            </a:r>
+            <a:endParaRPr lang="en-US" dirty="0"/>
+          </a:p>
+        </p:txBody>
+      </p:sp>
+      <p:sp>
+        <p:nvSpPr>
+          <p:cNvPr id="10" name="Down Arrow 9"/>
           <p:cNvSpPr/>
           <p:nvPr/>
         </p:nvSpPr>
         <p:spPr>
           <a:xfrm>
-            <a:off x="4572000" y="2677947"/>
-            <a:ext cx="2007909" cy="886120"/>
-          </a:xfrm>
-          <a:prstGeom prst="roundRect">
-            <a:avLst/>
-          </a:prstGeom>
-        </p:spPr>
-        <p:style>
-          <a:lnRef idx="2">
-            <a:schemeClr val="accent6">
-              <a:shade val="50000"/>
-            </a:schemeClr>
-          </a:lnRef>
-          <a:fillRef idx="1">
-            <a:schemeClr val="accent6"/>
-          </a:fillRef>
-          <a:effectRef idx="0">
-            <a:schemeClr val="accent6"/>
-          </a:effectRef>
-          <a:fontRef idx="minor">
-            <a:schemeClr val="lt1"/>
-          </a:fontRef>
-        </p:style>
-        <p:txBody>
-          <a:bodyPr rtlCol="0" anchor="ctr"/>
-          <a:lstStyle/>
-          <a:p>
-            <a:pPr algn="ctr"/>
-            <a:r>
-              <a:rPr lang="en-US" dirty="0" err="1" smtClean="0"/>
-              <a:t>HAProxy</a:t>
-            </a:r>
-            <a:endParaRPr lang="en-US" dirty="0"/>
-          </a:p>
-        </p:txBody>
-      </p:sp>
-      <p:sp>
-        <p:nvSpPr>
-          <p:cNvPr id="8" name="Rounded Rectangle 7"/>
-          <p:cNvSpPr/>
-          <p:nvPr/>
-        </p:nvSpPr>
-        <p:spPr>
-          <a:xfrm>
-            <a:off x="4647414" y="1753386"/>
-            <a:ext cx="1932495" cy="471340"/>
-          </a:xfrm>
-          <a:prstGeom prst="roundRect">
+            <a:off x="5498182" y="2278981"/>
+            <a:ext cx="230957" cy="349526"/>
+          </a:xfrm>
+          <a:prstGeom prst="downArrow">
             <a:avLst/>
           </a:prstGeom>
         </p:spPr>
@@ -6009,24 +6161,20 @@
           <a:lstStyle/>
           <a:p>
             <a:pPr algn="ctr"/>
-            <a:r>
-              <a:rPr lang="en-US" dirty="0" smtClean="0"/>
-              <a:t>PGAdmin4</a:t>
-            </a:r>
-            <a:endParaRPr lang="en-US" dirty="0"/>
-          </a:p>
-        </p:txBody>
-      </p:sp>
-      <p:sp>
-        <p:nvSpPr>
-          <p:cNvPr id="10" name="Down Arrow 9"/>
+            <a:endParaRPr lang="en-US"/>
+          </a:p>
+        </p:txBody>
+      </p:sp>
+      <p:sp>
+        <p:nvSpPr>
+          <p:cNvPr id="11" name="Down Arrow 10"/>
           <p:cNvSpPr/>
           <p:nvPr/>
         </p:nvSpPr>
         <p:spPr>
-          <a:xfrm>
-            <a:off x="5498182" y="2278981"/>
-            <a:ext cx="230957" cy="349526"/>
+          <a:xfrm rot="3544126">
+            <a:off x="3774181" y="2926591"/>
+            <a:ext cx="245097" cy="1111627"/>
           </a:xfrm>
           <a:prstGeom prst="downArrow">
             <a:avLst/>
@@ -6057,50 +6205,10 @@
           </a:p>
         </p:txBody>
       </p:sp>
-      <p:sp>
-        <p:nvSpPr>
-          <p:cNvPr id="11" name="Down Arrow 10"/>
-          <p:cNvSpPr/>
-          <p:nvPr/>
-        </p:nvSpPr>
-        <p:spPr>
-          <a:xfrm rot="3544126">
-            <a:off x="3774181" y="2926591"/>
-            <a:ext cx="245097" cy="1111627"/>
-          </a:xfrm>
-          <a:prstGeom prst="downArrow">
-            <a:avLst/>
-          </a:prstGeom>
-        </p:spPr>
-        <p:style>
-          <a:lnRef idx="2">
-            <a:schemeClr val="accent1">
-              <a:shade val="50000"/>
-            </a:schemeClr>
-          </a:lnRef>
-          <a:fillRef idx="1">
-            <a:schemeClr val="accent1"/>
-          </a:fillRef>
-          <a:effectRef idx="0">
-            <a:schemeClr val="accent1"/>
-          </a:effectRef>
-          <a:fontRef idx="minor">
-            <a:schemeClr val="lt1"/>
-          </a:fontRef>
-        </p:style>
-        <p:txBody>
-          <a:bodyPr rtlCol="0" anchor="ctr"/>
-          <a:lstStyle/>
-          <a:p>
-            <a:pPr algn="ctr"/>
-            <a:endParaRPr lang="en-US"/>
-          </a:p>
-        </p:txBody>
-      </p:sp>
     </p:spTree>
     <p:extLst>
       <p:ext uri="{BB962C8B-B14F-4D97-AF65-F5344CB8AC3E}">
-        <p14:creationId xmlns:p14="http://schemas.microsoft.com/office/powerpoint/2010/main" val="1404766497"/>
+        <p14:creationId xmlns:p14="http://schemas.microsoft.com/office/powerpoint/2010/main" val="4283612801"/>
       </p:ext>
     </p:extLst>
   </p:cSld>

</xml_diff>